<commit_message>
Worked on the raga rec chapter, hopefully a decent version
I should be send it to Joan asap..
</commit_message>
<xml_diff>
--- a/ch07_ragaRecognition/figures/tdms_computation.pptx
+++ b/ch07_ragaRecognition/figures/tdms_computation.pptx
@@ -105,6 +105,22 @@
       </a:defRPr>
     </a:lvl9pPr>
   </p:defaultTextStyle>
+  <p:extLst>
+    <p:ext uri="{EFAFB233-063F-42B5-8137-9DF3F51BA10A}">
+      <p15:sldGuideLst xmlns:p15="http://schemas.microsoft.com/office/powerpoint/2012/main">
+        <p15:guide id="1" orient="horz" pos="2160">
+          <p15:clr>
+            <a:srgbClr val="A4A3A4"/>
+          </p15:clr>
+        </p15:guide>
+        <p15:guide id="2" pos="3897">
+          <p15:clr>
+            <a:srgbClr val="A4A3A4"/>
+          </p15:clr>
+        </p15:guide>
+      </p15:sldGuideLst>
+    </p:ext>
+  </p:extLst>
 </p:presentation>
 </file>
 
@@ -289,7 +305,7 @@
           <a:p>
             <a:fld id="{5ECA47BD-3D97-624A-B6F6-66B77AF049DD}" type="datetimeFigureOut">
               <a:rPr lang="en-US" smtClean="0"/>
-              <a:t>3/14/16</a:t>
+              <a:t>9/16/16</a:t>
             </a:fld>
             <a:endParaRPr lang="en-US"/>
           </a:p>
@@ -459,7 +475,7 @@
           <a:p>
             <a:fld id="{5ECA47BD-3D97-624A-B6F6-66B77AF049DD}" type="datetimeFigureOut">
               <a:rPr lang="en-US" smtClean="0"/>
-              <a:t>3/14/16</a:t>
+              <a:t>9/16/16</a:t>
             </a:fld>
             <a:endParaRPr lang="en-US"/>
           </a:p>
@@ -639,7 +655,7 @@
           <a:p>
             <a:fld id="{5ECA47BD-3D97-624A-B6F6-66B77AF049DD}" type="datetimeFigureOut">
               <a:rPr lang="en-US" smtClean="0"/>
-              <a:t>3/14/16</a:t>
+              <a:t>9/16/16</a:t>
             </a:fld>
             <a:endParaRPr lang="en-US"/>
           </a:p>
@@ -809,7 +825,7 @@
           <a:p>
             <a:fld id="{5ECA47BD-3D97-624A-B6F6-66B77AF049DD}" type="datetimeFigureOut">
               <a:rPr lang="en-US" smtClean="0"/>
-              <a:t>3/14/16</a:t>
+              <a:t>9/16/16</a:t>
             </a:fld>
             <a:endParaRPr lang="en-US"/>
           </a:p>
@@ -1055,7 +1071,7 @@
           <a:p>
             <a:fld id="{5ECA47BD-3D97-624A-B6F6-66B77AF049DD}" type="datetimeFigureOut">
               <a:rPr lang="en-US" smtClean="0"/>
-              <a:t>3/14/16</a:t>
+              <a:t>9/16/16</a:t>
             </a:fld>
             <a:endParaRPr lang="en-US"/>
           </a:p>
@@ -1343,7 +1359,7 @@
           <a:p>
             <a:fld id="{5ECA47BD-3D97-624A-B6F6-66B77AF049DD}" type="datetimeFigureOut">
               <a:rPr lang="en-US" smtClean="0"/>
-              <a:t>3/14/16</a:t>
+              <a:t>9/16/16</a:t>
             </a:fld>
             <a:endParaRPr lang="en-US"/>
           </a:p>
@@ -1765,7 +1781,7 @@
           <a:p>
             <a:fld id="{5ECA47BD-3D97-624A-B6F6-66B77AF049DD}" type="datetimeFigureOut">
               <a:rPr lang="en-US" smtClean="0"/>
-              <a:t>3/14/16</a:t>
+              <a:t>9/16/16</a:t>
             </a:fld>
             <a:endParaRPr lang="en-US"/>
           </a:p>
@@ -1883,7 +1899,7 @@
           <a:p>
             <a:fld id="{5ECA47BD-3D97-624A-B6F6-66B77AF049DD}" type="datetimeFigureOut">
               <a:rPr lang="en-US" smtClean="0"/>
-              <a:t>3/14/16</a:t>
+              <a:t>9/16/16</a:t>
             </a:fld>
             <a:endParaRPr lang="en-US"/>
           </a:p>
@@ -1978,7 +1994,7 @@
           <a:p>
             <a:fld id="{5ECA47BD-3D97-624A-B6F6-66B77AF049DD}" type="datetimeFigureOut">
               <a:rPr lang="en-US" smtClean="0"/>
-              <a:t>3/14/16</a:t>
+              <a:t>9/16/16</a:t>
             </a:fld>
             <a:endParaRPr lang="en-US"/>
           </a:p>
@@ -2255,7 +2271,7 @@
           <a:p>
             <a:fld id="{5ECA47BD-3D97-624A-B6F6-66B77AF049DD}" type="datetimeFigureOut">
               <a:rPr lang="en-US" smtClean="0"/>
-              <a:t>3/14/16</a:t>
+              <a:t>9/16/16</a:t>
             </a:fld>
             <a:endParaRPr lang="en-US"/>
           </a:p>
@@ -2508,7 +2524,7 @@
           <a:p>
             <a:fld id="{5ECA47BD-3D97-624A-B6F6-66B77AF049DD}" type="datetimeFigureOut">
               <a:rPr lang="en-US" smtClean="0"/>
-              <a:t>3/14/16</a:t>
+              <a:t>9/16/16</a:t>
             </a:fld>
             <a:endParaRPr lang="en-US"/>
           </a:p>
@@ -2721,7 +2737,7 @@
           <a:p>
             <a:fld id="{5ECA47BD-3D97-624A-B6F6-66B77AF049DD}" type="datetimeFigureOut">
               <a:rPr lang="en-US" smtClean="0"/>
-              <a:t>3/14/16</a:t>
+              <a:t>9/16/16</a:t>
             </a:fld>
             <a:endParaRPr lang="en-US"/>
           </a:p>
@@ -3168,14 +3184,24 @@
           <a:p>
             <a:pPr algn="ctr"/>
             <a:r>
-              <a:rPr lang="en-US" dirty="0" smtClean="0">
+              <a:rPr lang="en-US" smtClean="0">
                 <a:solidFill>
                   <a:schemeClr val="tx1"/>
                 </a:solidFill>
                 <a:latin typeface="Times"/>
                 <a:cs typeface="Times"/>
               </a:rPr>
-              <a:t>Predominant Melody Estimation</a:t>
+              <a:t>Predominant </a:t>
+            </a:r>
+            <a:r>
+              <a:rPr lang="en-US" smtClean="0">
+                <a:solidFill>
+                  <a:schemeClr val="tx1"/>
+                </a:solidFill>
+                <a:latin typeface="Times"/>
+                <a:cs typeface="Times"/>
+              </a:rPr>
+              <a:t>Pitch Estimation</a:t>
             </a:r>
             <a:endParaRPr lang="en-US" dirty="0">
               <a:solidFill>
@@ -3814,7 +3840,7 @@
                 <a:latin typeface="Times"/>
                 <a:cs typeface="Times"/>
               </a:rPr>
-              <a:t>Feature</a:t>
+              <a:t>TDMS</a:t>
             </a:r>
             <a:endParaRPr lang="en-US" dirty="0">
               <a:latin typeface="Times"/>
@@ -4287,7 +4313,17 @@
                 <a:latin typeface="Times"/>
                 <a:cs typeface="Times"/>
               </a:rPr>
-              <a:t>Predominant Melody Estimation</a:t>
+              <a:t>Predominant </a:t>
+            </a:r>
+            <a:r>
+              <a:rPr lang="en-US" dirty="0" smtClean="0">
+                <a:solidFill>
+                  <a:schemeClr val="tx1"/>
+                </a:solidFill>
+                <a:latin typeface="Times"/>
+                <a:cs typeface="Times"/>
+              </a:rPr>
+              <a:t>Pitch Estimation</a:t>
             </a:r>
             <a:endParaRPr lang="en-US" dirty="0">
               <a:solidFill>

</xml_diff>